<commit_message>
changed: server slide color should be blue
</commit_message>
<xml_diff>
--- a/esercitazione_1/documents/Esercitazione 1.pptx
+++ b/esercitazione_1/documents/Esercitazione 1.pptx
@@ -8680,6 +8680,73 @@
           <a:chExt cx="0" cy="0"/>
         </a:xfrm>
       </p:grpSpPr>
+      <p:grpSp>
+        <p:nvGrpSpPr>
+          <p:cNvPr id="8" name="Group 2">
+            <a:extLst>
+              <a:ext uri="{FF2B5EF4-FFF2-40B4-BE49-F238E27FC236}">
+                <a16:creationId xmlns:a16="http://schemas.microsoft.com/office/drawing/2014/main" id="{DF556BB9-07D6-4111-A5B9-F2A0E026E464}"/>
+              </a:ext>
+            </a:extLst>
+          </p:cNvPr>
+          <p:cNvGrpSpPr/>
+          <p:nvPr/>
+        </p:nvGrpSpPr>
+        <p:grpSpPr>
+          <a:xfrm>
+            <a:off x="-12284" y="0"/>
+            <a:ext cx="18300284" cy="10287000"/>
+            <a:chOff x="0" y="0"/>
+            <a:chExt cx="3267146" cy="3479800"/>
+          </a:xfrm>
+        </p:grpSpPr>
+        <p:sp>
+          <p:nvSpPr>
+            <p:cNvPr id="9" name="Freeform 3">
+              <a:extLst>
+                <a:ext uri="{FF2B5EF4-FFF2-40B4-BE49-F238E27FC236}">
+                  <a16:creationId xmlns:a16="http://schemas.microsoft.com/office/drawing/2014/main" id="{D175FC83-0FB5-41DB-9424-BFF2A67A24A0}"/>
+                </a:ext>
+              </a:extLst>
+            </p:cNvPr>
+            <p:cNvSpPr/>
+            <p:nvPr/>
+          </p:nvSpPr>
+          <p:spPr>
+            <a:xfrm>
+              <a:off x="0" y="0"/>
+              <a:ext cx="3267146" cy="3479800"/>
+            </a:xfrm>
+            <a:custGeom>
+              <a:avLst/>
+              <a:gdLst/>
+              <a:ahLst/>
+              <a:cxnLst/>
+              <a:rect l="l" t="t" r="r" b="b"/>
+              <a:pathLst>
+                <a:path w="3267146" h="3479800">
+                  <a:moveTo>
+                    <a:pt x="0" y="0"/>
+                  </a:moveTo>
+                  <a:lnTo>
+                    <a:pt x="3267146" y="0"/>
+                  </a:lnTo>
+                  <a:lnTo>
+                    <a:pt x="3267146" y="3479800"/>
+                  </a:lnTo>
+                  <a:lnTo>
+                    <a:pt x="0" y="3479800"/>
+                  </a:lnTo>
+                  <a:close/>
+                </a:path>
+              </a:pathLst>
+            </a:custGeom>
+            <a:solidFill>
+              <a:srgbClr val="004AAD"/>
+            </a:solidFill>
+          </p:spPr>
+        </p:sp>
+      </p:grpSp>
       <p:sp>
         <p:nvSpPr>
           <p:cNvPr id="12" name="Freeform 6">
@@ -8736,7 +8803,7 @@
             </a:pathLst>
           </a:custGeom>
           <a:solidFill>
-            <a:srgbClr val="004AAD"/>
+            <a:schemeClr val="accent6"/>
           </a:solidFill>
         </p:spPr>
       </p:sp>
@@ -8820,11 +8887,17 @@
             </a:pPr>
             <a:r>
               <a:rPr lang="en-US" sz="5400" dirty="0" err="1">
+                <a:solidFill>
+                  <a:schemeClr val="bg1"/>
+                </a:solidFill>
                 <a:latin typeface="Open Sans Extra Bold"/>
               </a:rPr>
               <a:t>Implementazione</a:t>
             </a:r>
             <a:endParaRPr lang="en-US" sz="5400" dirty="0" err="1">
+              <a:solidFill>
+                <a:schemeClr val="bg1"/>
+              </a:solidFill>
               <a:latin typeface="Open Sans Extra Bold"/>
               <a:ea typeface="Open Sans Extra Bold"/>
               <a:cs typeface="Open Sans Extra Bold"/>
@@ -8866,11 +8939,17 @@
             </a:pPr>
             <a:r>
               <a:rPr lang="en-US" sz="5150" dirty="0">
+                <a:solidFill>
+                  <a:schemeClr val="bg1"/>
+                </a:solidFill>
                 <a:latin typeface="Open Sans"/>
               </a:rPr>
               <a:t>JAVA - RS</a:t>
             </a:r>
             <a:endParaRPr lang="en-US" sz="5150" dirty="0">
+              <a:solidFill>
+                <a:schemeClr val="bg1"/>
+              </a:solidFill>
               <a:latin typeface="Open Sans"/>
               <a:ea typeface="Open Sans"/>
               <a:cs typeface="Open Sans"/>

</xml_diff>